<commit_message>
committing before pulling down master
</commit_message>
<xml_diff>
--- a/CovidHackathonPowerPoint.pptx
+++ b/CovidHackathonPowerPoint.pptx
@@ -4706,7 +4706,7 @@
           <a:p>
             <a:fld id="{59088EAF-6ECA-4616-85EF-35AA19C641F3}" type="datetimeFigureOut">
               <a:rPr lang="en-US"/>
-              <a:t>8/11/2020</a:t>
+              <a:t>8/12/2020</a:t>
             </a:fld>
             <a:endParaRPr/>
           </a:p>
@@ -4871,7 +4871,7 @@
           <a:p>
             <a:fld id="{3ABD2D7A-D230-4F91-BD59-0A39C2703BA8}" type="datetimeFigureOut">
               <a:rPr lang="en-US"/>
-              <a:t>8/11/2020</a:t>
+              <a:t>8/12/2020</a:t>
             </a:fld>
             <a:endParaRPr/>
           </a:p>
@@ -5480,7 +5480,7 @@
           <a:p>
             <a:fld id="{03F41C87-7AD9-4845-A077-840E4A0F3F06}" type="datetimeFigureOut">
               <a:rPr lang="en-US"/>
-              <a:t>8/11/2020</a:t>
+              <a:t>8/12/2020</a:t>
             </a:fld>
             <a:endParaRPr/>
           </a:p>
@@ -5672,7 +5672,7 @@
           <a:p>
             <a:fld id="{03F41C87-7AD9-4845-A077-840E4A0F3F06}" type="datetimeFigureOut">
               <a:rPr lang="en-US"/>
-              <a:t>8/11/2020</a:t>
+              <a:t>8/12/2020</a:t>
             </a:fld>
             <a:endParaRPr/>
           </a:p>
@@ -5861,7 +5861,7 @@
           <a:p>
             <a:fld id="{03F41C87-7AD9-4845-A077-840E4A0F3F06}" type="datetimeFigureOut">
               <a:rPr lang="en-US"/>
-              <a:t>8/11/2020</a:t>
+              <a:t>8/12/2020</a:t>
             </a:fld>
             <a:endParaRPr/>
           </a:p>
@@ -6141,7 +6141,7 @@
           <a:p>
             <a:fld id="{03F41C87-7AD9-4845-A077-840E4A0F3F06}" type="datetimeFigureOut">
               <a:rPr lang="en-US"/>
-              <a:t>8/11/2020</a:t>
+              <a:t>8/12/2020</a:t>
             </a:fld>
             <a:endParaRPr/>
           </a:p>
@@ -6445,7 +6445,7 @@
           <a:p>
             <a:fld id="{03F41C87-7AD9-4845-A077-840E4A0F3F06}" type="datetimeFigureOut">
               <a:rPr lang="en-US"/>
-              <a:t>8/11/2020</a:t>
+              <a:t>8/12/2020</a:t>
             </a:fld>
             <a:endParaRPr/>
           </a:p>
@@ -6901,7 +6901,7 @@
           <a:p>
             <a:fld id="{03F41C87-7AD9-4845-A077-840E4A0F3F06}" type="datetimeFigureOut">
               <a:rPr lang="en-US"/>
-              <a:t>8/11/2020</a:t>
+              <a:t>8/12/2020</a:t>
             </a:fld>
             <a:endParaRPr/>
           </a:p>
@@ -7031,7 +7031,7 @@
           <a:p>
             <a:fld id="{03F41C87-7AD9-4845-A077-840E4A0F3F06}" type="datetimeFigureOut">
               <a:rPr lang="en-US"/>
-              <a:t>8/11/2020</a:t>
+              <a:t>8/12/2020</a:t>
             </a:fld>
             <a:endParaRPr/>
           </a:p>
@@ -7146,7 +7146,7 @@
           <a:p>
             <a:fld id="{03F41C87-7AD9-4845-A077-840E4A0F3F06}" type="datetimeFigureOut">
               <a:rPr lang="en-US"/>
-              <a:t>8/11/2020</a:t>
+              <a:t>8/12/2020</a:t>
             </a:fld>
             <a:endParaRPr/>
           </a:p>
@@ -7468,7 +7468,7 @@
           <a:p>
             <a:fld id="{03F41C87-7AD9-4845-A077-840E4A0F3F06}" type="datetimeFigureOut">
               <a:rPr lang="en-US"/>
-              <a:t>8/11/2020</a:t>
+              <a:t>8/12/2020</a:t>
             </a:fld>
             <a:endParaRPr/>
           </a:p>
@@ -7780,7 +7780,7 @@
             <a:fld id="{03F41C87-7AD9-4845-A077-840E4A0F3F06}" type="datetimeFigureOut">
               <a:rPr lang="en-US"/>
               <a:pPr/>
-              <a:t>8/11/2020</a:t>
+              <a:t>8/12/2020</a:t>
             </a:fld>
             <a:endParaRPr/>
           </a:p>
@@ -8034,7 +8034,7 @@
             <a:fld id="{03F41C87-7AD9-4845-A077-840E4A0F3F06}" type="datetimeFigureOut">
               <a:rPr lang="en-US" smtClean="0"/>
               <a:pPr/>
-              <a:t>8/11/2020</a:t>
+              <a:t>8/12/2020</a:t>
             </a:fld>
             <a:endParaRPr lang="en-US"/>
           </a:p>
@@ -9118,7 +9118,7 @@
           <a:p>
             <a:r>
               <a:rPr lang="en-US" u="sng" dirty="0"/>
-              <a:t>OUR SOLUTION:</a:t>
+              <a:t>Thoughts leading up to solution:</a:t>
             </a:r>
             <a:br>
               <a:rPr lang="en-US" dirty="0"/>
@@ -9148,6 +9148,54 @@
           <a:bodyPr/>
           <a:lstStyle/>
           <a:p>
+            <a:r>
+              <a:rPr lang="en-US" dirty="0"/>
+              <a:t>Could we use New York as our base case?  </a:t>
+            </a:r>
+          </a:p>
+          <a:p>
+            <a:pPr lvl="1"/>
+            <a:r>
+              <a:rPr lang="en-US" dirty="0"/>
+              <a:t>Since it appears New York has cycled thru, could we look at the graph and find values where growth rate was when cases were spiking?</a:t>
+            </a:r>
+          </a:p>
+          <a:p>
+            <a:pPr lvl="1"/>
+            <a:r>
+              <a:rPr lang="en-US" dirty="0"/>
+              <a:t>Could we train on New York and apply that to the Midwest?</a:t>
+            </a:r>
+          </a:p>
+          <a:p>
+            <a:r>
+              <a:rPr lang="en-US" dirty="0"/>
+              <a:t>We want to determine when the Midwest will spike</a:t>
+            </a:r>
+          </a:p>
+          <a:p>
+            <a:pPr lvl="1"/>
+            <a:r>
+              <a:rPr lang="en-US" dirty="0"/>
+              <a:t>What features would we want to use? Look at ICU beds, ventilators.  Create growth rate column, increase in cases</a:t>
+            </a:r>
+          </a:p>
+          <a:p>
+            <a:r>
+              <a:rPr lang="en-US" dirty="0"/>
+              <a:t>Rolling averages????</a:t>
+            </a:r>
+          </a:p>
+          <a:p>
+            <a:pPr marL="231775" lvl="1" indent="0">
+              <a:buNone/>
+            </a:pPr>
+            <a:endParaRPr lang="en-US" dirty="0"/>
+          </a:p>
+          <a:p>
+            <a:pPr marL="231775" lvl="1" indent="0">
+              <a:buNone/>
+            </a:pPr>
             <a:endParaRPr lang="en-US" dirty="0"/>
           </a:p>
         </p:txBody>

</xml_diff>